<commit_message>
Finalised Initial Project Proposal
</commit_message>
<xml_diff>
--- a/InitialProjectProposal-Grp19.pptx
+++ b/InitialProjectProposal-Grp19.pptx
@@ -105,6 +105,11 @@
       </a:defRPr>
     </a:lvl9pPr>
   </p:defaultTextStyle>
+  <p:extLst>
+    <p:ext uri="{EFAFB233-063F-42B5-8137-9DF3F51BA10A}">
+      <p15:sldGuideLst xmlns:p15="http://schemas.microsoft.com/office/powerpoint/2012/main"/>
+    </p:ext>
+  </p:extLst>
 </p:presentation>
 </file>
 
@@ -2303,12 +2308,36 @@
         </p:nvSpPr>
         <p:spPr/>
         <p:txBody>
-          <a:bodyPr/>
+          <a:bodyPr>
+            <a:normAutofit/>
+          </a:bodyPr>
           <a:lstStyle/>
           <a:p>
             <a:r>
-              <a:rPr lang="en-GB" dirty="0"/>
-              <a:t>The first slide should lay out the STEM concept that the demo is to convey</a:t>
+              <a:rPr lang="en-GB" sz="2800" dirty="0"/>
+              <a:t>Tracking solar panels are ones that follow the sun’s movement across the sky, keeping the incidence angle of the light as close to perpendicular as possible and therefore maximising efficiency of the panel. </a:t>
+            </a:r>
+          </a:p>
+          <a:p>
+            <a:r>
+              <a:rPr lang="en-GB" sz="2800" dirty="0"/>
+              <a:t>The incidence angle of light hitting the panel is the main factor directly affecting its power output (excluding clearness index). </a:t>
+            </a:r>
+          </a:p>
+          <a:p>
+            <a:r>
+              <a:rPr lang="en-GB" sz="2800" dirty="0"/>
+              <a:t>Compared with fixed panels, tracking ones can generate “as much as 10 to 25%” more (</a:t>
+            </a:r>
+            <a:r>
+              <a:rPr lang="en-GB" sz="2800" dirty="0">
+                <a:hlinkClick r:id="rId2"/>
+              </a:rPr>
+              <a:t>https://sinovoltaics.com/learning-center/csp/solar-tracker/</a:t>
+            </a:r>
+            <a:r>
+              <a:rPr lang="en-GB" sz="2800" dirty="0"/>
+              <a:t>).</a:t>
             </a:r>
           </a:p>
         </p:txBody>
@@ -2336,7 +2365,7 @@
           <a:p>
             <a:r>
               <a:rPr lang="en-GB" dirty="0"/>
-              <a:t>STEM Concept</a:t>
+              <a:t>Tracking Solar Panel</a:t>
             </a:r>
           </a:p>
         </p:txBody>
@@ -2395,15 +2424,43 @@
             <p:ph idx="1"/>
           </p:nvPr>
         </p:nvSpPr>
-        <p:spPr/>
+        <p:spPr>
+          <a:xfrm>
+            <a:off x="513347" y="1422492"/>
+            <a:ext cx="10972800" cy="2851125"/>
+          </a:xfrm>
+        </p:spPr>
         <p:txBody>
-          <a:bodyPr/>
+          <a:bodyPr>
+            <a:normAutofit fontScale="92500" lnSpcReduction="10000"/>
+          </a:bodyPr>
           <a:lstStyle/>
           <a:p>
             <a:r>
-              <a:rPr lang="en-GB" dirty="0"/>
-              <a:t>The second slide should briefly describe what the finished product may look like, what it will do, what the audience will do. </a:t>
-            </a:r>
+              <a:rPr lang="en-GB" sz="2800" dirty="0"/>
+              <a:t>The demonstration will show what factors affect the power generation of a solar panel and the importance of the incidence angle.  </a:t>
+            </a:r>
+          </a:p>
+          <a:p>
+            <a:r>
+              <a:rPr lang="en-GB" sz="2800" dirty="0"/>
+              <a:t>The demo will consist of a tracking solar panel (using LDR), light source, control panel and power output information display. </a:t>
+            </a:r>
+          </a:p>
+          <a:p>
+            <a:r>
+              <a:rPr lang="en-GB" sz="2800" dirty="0"/>
+              <a:t>The user will be able to move the light source and adjust the settings of both the light source and solar panel.  They will also be able to take manual control of the tilt angle of the panel. </a:t>
+            </a:r>
+          </a:p>
+          <a:p>
+            <a:endParaRPr lang="en-GB" sz="2800" dirty="0"/>
+          </a:p>
+          <a:p>
+            <a:pPr marL="0" indent="0">
+              <a:buNone/>
+            </a:pPr>
+            <a:endParaRPr lang="en-GB" dirty="0"/>
           </a:p>
         </p:txBody>
       </p:sp>
@@ -2432,6 +2489,91 @@
               <a:rPr lang="en-GB" dirty="0"/>
               <a:t>Vision for the DEMO</a:t>
             </a:r>
+          </a:p>
+        </p:txBody>
+      </p:sp>
+      <p:pic>
+        <p:nvPicPr>
+          <p:cNvPr id="11" name="Picture 10" descr="Diagram&#10;&#10;Description automatically generated">
+            <a:extLst>
+              <a:ext uri="{FF2B5EF4-FFF2-40B4-BE49-F238E27FC236}">
+                <a16:creationId xmlns:a16="http://schemas.microsoft.com/office/drawing/2014/main" id="{DCFD7480-E20E-5E0E-EEAD-44356B7A186D}"/>
+              </a:ext>
+            </a:extLst>
+          </p:cNvPr>
+          <p:cNvPicPr>
+            <a:picLocks noChangeAspect="1"/>
+          </p:cNvPicPr>
+          <p:nvPr/>
+        </p:nvPicPr>
+        <p:blipFill>
+          <a:blip r:embed="rId2">
+            <a:extLst>
+              <a:ext uri="{28A0092B-C50C-407E-A947-70E740481C1C}">
+                <a14:useLocalDpi xmlns:a14="http://schemas.microsoft.com/office/drawing/2010/main" val="0"/>
+              </a:ext>
+            </a:extLst>
+          </a:blip>
+          <a:stretch>
+            <a:fillRect/>
+          </a:stretch>
+        </p:blipFill>
+        <p:spPr>
+          <a:xfrm>
+            <a:off x="7741486" y="3917483"/>
+            <a:ext cx="4450514" cy="2940518"/>
+          </a:xfrm>
+          <a:prstGeom prst="rect">
+            <a:avLst/>
+          </a:prstGeom>
+        </p:spPr>
+      </p:pic>
+      <p:sp>
+        <p:nvSpPr>
+          <p:cNvPr id="12" name="TextBox 11">
+            <a:extLst>
+              <a:ext uri="{FF2B5EF4-FFF2-40B4-BE49-F238E27FC236}">
+                <a16:creationId xmlns:a16="http://schemas.microsoft.com/office/drawing/2014/main" id="{1219C2A0-4539-52A9-4F3A-BF783CC22ACF}"/>
+              </a:ext>
+            </a:extLst>
+          </p:cNvPr>
+          <p:cNvSpPr txBox="1"/>
+          <p:nvPr/>
+        </p:nvSpPr>
+        <p:spPr>
+          <a:xfrm>
+            <a:off x="568074" y="4126466"/>
+            <a:ext cx="7447931" cy="2369880"/>
+          </a:xfrm>
+          <a:prstGeom prst="rect">
+            <a:avLst/>
+          </a:prstGeom>
+          <a:noFill/>
+        </p:spPr>
+        <p:txBody>
+          <a:bodyPr wrap="square" rtlCol="0">
+            <a:spAutoFit/>
+          </a:bodyPr>
+          <a:lstStyle/>
+          <a:p>
+            <a:pPr marL="285750" indent="-285750">
+              <a:buFont typeface="Arial" panose="020B0604020202020204" pitchFamily="34" charset="0"/>
+              <a:buChar char="•"/>
+            </a:pPr>
+            <a:r>
+              <a:rPr lang="en-GB" sz="2600" dirty="0">
+                <a:latin typeface="Arial" panose="020B0604020202020204" pitchFamily="34" charset="0"/>
+                <a:cs typeface="Arial" panose="020B0604020202020204" pitchFamily="34" charset="0"/>
+              </a:rPr>
+              <a:t>The user will learn how a tracking solar panel works and that it will have a higher efficiency across each day than a fixed panel and gain a better understanding on how an LDR sensor works. </a:t>
+            </a:r>
+          </a:p>
+          <a:p>
+            <a:pPr marL="285750" indent="-285750">
+              <a:buFont typeface="Arial" panose="020B0604020202020204" pitchFamily="34" charset="0"/>
+              <a:buChar char="•"/>
+            </a:pPr>
+            <a:endParaRPr lang="en-GB" dirty="0"/>
           </a:p>
         </p:txBody>
       </p:sp>
@@ -2976,18 +3118,18 @@
 </file>
 
 <file path=customXml/item2.xml><?xml version="1.0" encoding="utf-8"?>
+<p:properties xmlns:p="http://schemas.microsoft.com/office/2006/metadata/properties" xmlns:xsi="http://www.w3.org/2001/XMLSchema-instance" xmlns:pc="http://schemas.microsoft.com/office/infopath/2007/PartnerControls">
+  <documentManagement/>
+</p:properties>
+</file>
+
+<file path=customXml/item3.xml><?xml version="1.0" encoding="utf-8"?>
 <?mso-contentType ?>
 <FormTemplates xmlns="http://schemas.microsoft.com/sharepoint/v3/contenttype/forms">
   <Display>DocumentLibraryForm</Display>
   <Edit>DocumentLibraryForm</Edit>
   <New>DocumentLibraryForm</New>
 </FormTemplates>
-</file>
-
-<file path=customXml/item3.xml><?xml version="1.0" encoding="utf-8"?>
-<p:properties xmlns:p="http://schemas.microsoft.com/office/2006/metadata/properties" xmlns:xsi="http://www.w3.org/2001/XMLSchema-instance" xmlns:pc="http://schemas.microsoft.com/office/infopath/2007/PartnerControls">
-  <documentManagement/>
-</p:properties>
 </file>
 
 <file path=customXml/itemProps1.xml><?xml version="1.0" encoding="utf-8"?>
@@ -3010,14 +3152,6 @@
 </file>
 
 <file path=customXml/itemProps2.xml><?xml version="1.0" encoding="utf-8"?>
-<ds:datastoreItem xmlns:ds="http://schemas.openxmlformats.org/officeDocument/2006/customXml" ds:itemID="{58717D5E-5997-437F-8E0A-44F5CCD6AD61}">
-  <ds:schemaRefs>
-    <ds:schemaRef ds:uri="http://schemas.microsoft.com/sharepoint/v3/contenttype/forms"/>
-  </ds:schemaRefs>
-</ds:datastoreItem>
-</file>
-
-<file path=customXml/itemProps3.xml><?xml version="1.0" encoding="utf-8"?>
 <ds:datastoreItem xmlns:ds="http://schemas.openxmlformats.org/officeDocument/2006/customXml" ds:itemID="{62FE6AC1-6F89-4962-B310-F7B7FC3C13EE}">
   <ds:schemaRefs>
     <ds:schemaRef ds:uri="http://purl.org/dc/elements/1.1/"/>
@@ -3032,4 +3166,12 @@
     <ds:schemaRef ds:uri="http://schemas.microsoft.com/office/2006/metadata/properties"/>
   </ds:schemaRefs>
 </ds:datastoreItem>
+</file>
+
+<file path=customXml/itemProps3.xml><?xml version="1.0" encoding="utf-8"?>
+<ds:datastoreItem xmlns:ds="http://schemas.openxmlformats.org/officeDocument/2006/customXml" ds:itemID="{58717D5E-5997-437F-8E0A-44F5CCD6AD61}">
+  <ds:schemaRefs>
+    <ds:schemaRef ds:uri="http://schemas.microsoft.com/sharepoint/v3/contenttype/forms"/>
+  </ds:schemaRefs>
+</ds:datastoreItem>
 </file>
</xml_diff>